<commit_message>
ajout du dataset openfoodfact
</commit_message>
<xml_diff>
--- a/2-Comprendre_les_donnees.pptx
+++ b/2-Comprendre_les_donnees.pptx
@@ -408,7 +408,7 @@
           <a:effectLst/>
           <a:extLst>
             <a:ext uri="{91240B29-F687-4f45-9708-019B960494DF}">
-              <a14:hiddenLine xmlns="" xmlns:a14="http://schemas.microsoft.com/office/drawing/2010/main" w="9525">
+              <a14:hiddenLine xmlns:a14="http://schemas.microsoft.com/office/drawing/2010/main" xmlns="" w="9525">
                 <a:solidFill>
                   <a:srgbClr val="000000"/>
                 </a:solidFill>
@@ -1948,7 +1948,7 @@
           <a:ln/>
           <a:extLst>
             <a:ext uri="{91240B29-F687-4f45-9708-019B960494DF}">
-              <a14:hiddenLine xmlns="" xmlns:a14="http://schemas.microsoft.com/office/drawing/2010/main" w="9525">
+              <a14:hiddenLine xmlns:a14="http://schemas.microsoft.com/office/drawing/2010/main" xmlns="" w="9525">
                 <a:solidFill>
                   <a:srgbClr val="000000"/>
                 </a:solidFill>
@@ -2220,7 +2220,7 @@
           <a:ln/>
           <a:extLst>
             <a:ext uri="{91240B29-F687-4f45-9708-019B960494DF}">
-              <a14:hiddenLine xmlns="" xmlns:a14="http://schemas.microsoft.com/office/drawing/2010/main" w="9525">
+              <a14:hiddenLine xmlns:a14="http://schemas.microsoft.com/office/drawing/2010/main" xmlns="" w="9525">
                 <a:solidFill>
                   <a:srgbClr val="000000"/>
                 </a:solidFill>
@@ -2500,7 +2500,7 @@
           <a:ln/>
           <a:extLst>
             <a:ext uri="{91240B29-F687-4f45-9708-019B960494DF}">
-              <a14:hiddenLine xmlns="" xmlns:a14="http://schemas.microsoft.com/office/drawing/2010/main" w="9525">
+              <a14:hiddenLine xmlns:a14="http://schemas.microsoft.com/office/drawing/2010/main" xmlns="" w="9525">
                 <a:solidFill>
                   <a:srgbClr val="000000"/>
                 </a:solidFill>
@@ -3150,7 +3150,7 @@
           <a:ln/>
           <a:extLst>
             <a:ext uri="{91240B29-F687-4f45-9708-019B960494DF}">
-              <a14:hiddenLine xmlns="" xmlns:a14="http://schemas.microsoft.com/office/drawing/2010/main" w="9525">
+              <a14:hiddenLine xmlns:a14="http://schemas.microsoft.com/office/drawing/2010/main" xmlns="" w="9525">
                 <a:solidFill>
                   <a:srgbClr val="000000"/>
                 </a:solidFill>
@@ -3486,7 +3486,7 @@
           <a:ln/>
           <a:extLst>
             <a:ext uri="{91240B29-F687-4f45-9708-019B960494DF}">
-              <a14:hiddenLine xmlns="" xmlns:a14="http://schemas.microsoft.com/office/drawing/2010/main" w="9525">
+              <a14:hiddenLine xmlns:a14="http://schemas.microsoft.com/office/drawing/2010/main" xmlns="" w="9525">
                 <a:solidFill>
                   <a:srgbClr val="000000"/>
                 </a:solidFill>
@@ -3960,7 +3960,7 @@
           <a:ln/>
           <a:extLst>
             <a:ext uri="{91240B29-F687-4f45-9708-019B960494DF}">
-              <a14:hiddenLine xmlns="" xmlns:a14="http://schemas.microsoft.com/office/drawing/2010/main" w="9525">
+              <a14:hiddenLine xmlns:a14="http://schemas.microsoft.com/office/drawing/2010/main" xmlns="" w="9525">
                 <a:solidFill>
                   <a:srgbClr val="000000"/>
                 </a:solidFill>
@@ -4383,7 +4383,7 @@
           <a:ln/>
           <a:extLst>
             <a:ext uri="{91240B29-F687-4f45-9708-019B960494DF}">
-              <a14:hiddenLine xmlns="" xmlns:a14="http://schemas.microsoft.com/office/drawing/2010/main" w="9525">
+              <a14:hiddenLine xmlns:a14="http://schemas.microsoft.com/office/drawing/2010/main" xmlns="" w="9525">
                 <a:solidFill>
                   <a:srgbClr val="000000"/>
                 </a:solidFill>
@@ -6555,7 +6555,15 @@
             </a:r>
             <a:r>
               <a:rPr lang="fr-FR" dirty="0"/>
-              <a:t>) à 1 par exemple =&gt; nous verrons ceci  dans la partie « Exploration des Données avec les </a:t>
+              <a:t>) à 1 par exemple =&gt; nous verrons ceci  dans la partie « Exploration </a:t>
+            </a:r>
+            <a:r>
+              <a:rPr lang="fr-FR"/>
+              <a:t>des Données » </a:t>
+            </a:r>
+            <a:r>
+              <a:rPr lang="fr-FR" dirty="0"/>
+              <a:t>avec les </a:t>
             </a:r>
             <a:r>
               <a:rPr lang="fr-FR" dirty="0" err="1"/>

</xml_diff>